<commit_message>
updated readme and powerpoint
</commit_message>
<xml_diff>
--- a/DFS/Bullet Hell Dungeon _Milestone_1.pptx
+++ b/DFS/Bullet Hell Dungeon _Milestone_1.pptx
@@ -6,10 +6,9 @@
   </p:sldMasterIdLst>
   <p:sldIdLst>
     <p:sldId id="256" r:id="rId2"/>
-    <p:sldId id="259" r:id="rId3"/>
-    <p:sldId id="257" r:id="rId4"/>
-    <p:sldId id="261" r:id="rId5"/>
-    <p:sldId id="260" r:id="rId6"/>
+    <p:sldId id="257" r:id="rId3"/>
+    <p:sldId id="261" r:id="rId4"/>
+    <p:sldId id="260" r:id="rId5"/>
   </p:sldIdLst>
   <p:sldSz cx="12192000" cy="6858000"/>
   <p:notesSz cx="6858000" cy="9144000"/>
@@ -346,7 +345,7 @@
             <a:fld id="{B61BEF0D-F0BB-DE4B-95CE-6DB70DBA9567}" type="datetimeFigureOut">
               <a:rPr lang="en-US" dirty="0"/>
               <a:pPr/>
-              <a:t>6/14/2020</a:t>
+              <a:t>6/15/2020</a:t>
             </a:fld>
             <a:endParaRPr lang="en-US" dirty="0"/>
           </a:p>
@@ -677,7 +676,7 @@
             <a:fld id="{B61BEF0D-F0BB-DE4B-95CE-6DB70DBA9567}" type="datetimeFigureOut">
               <a:rPr lang="en-US" dirty="0"/>
               <a:pPr/>
-              <a:t>6/14/2020</a:t>
+              <a:t>6/15/2020</a:t>
             </a:fld>
             <a:endParaRPr lang="en-US" dirty="0"/>
           </a:p>
@@ -952,7 +951,7 @@
             <a:fld id="{B61BEF0D-F0BB-DE4B-95CE-6DB70DBA9567}" type="datetimeFigureOut">
               <a:rPr lang="en-US" dirty="0"/>
               <a:pPr/>
-              <a:t>6/14/2020</a:t>
+              <a:t>6/15/2020</a:t>
             </a:fld>
             <a:endParaRPr lang="en-US" dirty="0"/>
           </a:p>
@@ -1517,7 +1516,7 @@
             <a:fld id="{B61BEF0D-F0BB-DE4B-95CE-6DB70DBA9567}" type="datetimeFigureOut">
               <a:rPr lang="en-US" dirty="0"/>
               <a:pPr/>
-              <a:t>6/14/2020</a:t>
+              <a:t>6/15/2020</a:t>
             </a:fld>
             <a:endParaRPr lang="en-US" dirty="0"/>
           </a:p>
@@ -1792,7 +1791,7 @@
             <a:fld id="{B61BEF0D-F0BB-DE4B-95CE-6DB70DBA9567}" type="datetimeFigureOut">
               <a:rPr lang="en-US" dirty="0"/>
               <a:pPr/>
-              <a:t>6/14/2020</a:t>
+              <a:t>6/15/2020</a:t>
             </a:fld>
             <a:endParaRPr lang="en-US" dirty="0"/>
           </a:p>
@@ -2351,7 +2350,7 @@
             <a:fld id="{B61BEF0D-F0BB-DE4B-95CE-6DB70DBA9567}" type="datetimeFigureOut">
               <a:rPr lang="en-US" dirty="0"/>
               <a:pPr/>
-              <a:t>6/14/2020</a:t>
+              <a:t>6/15/2020</a:t>
             </a:fld>
             <a:endParaRPr lang="en-US" dirty="0"/>
           </a:p>
@@ -2675,7 +2674,7 @@
             <a:fld id="{B61BEF0D-F0BB-DE4B-95CE-6DB70DBA9567}" type="datetimeFigureOut">
               <a:rPr lang="en-US" dirty="0"/>
               <a:pPr/>
-              <a:t>6/14/2020</a:t>
+              <a:t>6/15/2020</a:t>
             </a:fld>
             <a:endParaRPr lang="en-US" dirty="0"/>
           </a:p>
@@ -2849,7 +2848,7 @@
             <a:fld id="{B61BEF0D-F0BB-DE4B-95CE-6DB70DBA9567}" type="datetimeFigureOut">
               <a:rPr lang="en-US" dirty="0"/>
               <a:pPr/>
-              <a:t>6/14/2020</a:t>
+              <a:t>6/15/2020</a:t>
             </a:fld>
             <a:endParaRPr lang="en-US" dirty="0"/>
           </a:p>
@@ -3084,7 +3083,7 @@
             <a:fld id="{B61BEF0D-F0BB-DE4B-95CE-6DB70DBA9567}" type="datetimeFigureOut">
               <a:rPr lang="en-US" dirty="0"/>
               <a:pPr/>
-              <a:t>6/14/2020</a:t>
+              <a:t>6/15/2020</a:t>
             </a:fld>
             <a:endParaRPr lang="en-US" dirty="0"/>
           </a:p>
@@ -3281,7 +3280,7 @@
             <a:fld id="{B61BEF0D-F0BB-DE4B-95CE-6DB70DBA9567}" type="datetimeFigureOut">
               <a:rPr lang="en-US" dirty="0"/>
               <a:pPr/>
-              <a:t>6/14/2020</a:t>
+              <a:t>6/15/2020</a:t>
             </a:fld>
             <a:endParaRPr lang="en-US" dirty="0"/>
           </a:p>
@@ -3554,7 +3553,7 @@
             <a:fld id="{B61BEF0D-F0BB-DE4B-95CE-6DB70DBA9567}" type="datetimeFigureOut">
               <a:rPr lang="en-US" dirty="0"/>
               <a:pPr/>
-              <a:t>6/14/2020</a:t>
+              <a:t>6/15/2020</a:t>
             </a:fld>
             <a:endParaRPr lang="en-US" dirty="0"/>
           </a:p>
@@ -3817,7 +3816,7 @@
             <a:fld id="{B61BEF0D-F0BB-DE4B-95CE-6DB70DBA9567}" type="datetimeFigureOut">
               <a:rPr lang="en-US" dirty="0"/>
               <a:pPr/>
-              <a:t>6/14/2020</a:t>
+              <a:t>6/15/2020</a:t>
             </a:fld>
             <a:endParaRPr lang="en-US" dirty="0"/>
           </a:p>
@@ -4188,7 +4187,7 @@
             <a:fld id="{B61BEF0D-F0BB-DE4B-95CE-6DB70DBA9567}" type="datetimeFigureOut">
               <a:rPr lang="en-US" dirty="0"/>
               <a:pPr/>
-              <a:t>6/14/2020</a:t>
+              <a:t>6/15/2020</a:t>
             </a:fld>
             <a:endParaRPr lang="en-US" dirty="0"/>
           </a:p>
@@ -4333,7 +4332,7 @@
             <a:fld id="{B61BEF0D-F0BB-DE4B-95CE-6DB70DBA9567}" type="datetimeFigureOut">
               <a:rPr lang="en-US" dirty="0"/>
               <a:pPr/>
-              <a:t>6/14/2020</a:t>
+              <a:t>6/15/2020</a:t>
             </a:fld>
             <a:endParaRPr lang="en-US" dirty="0"/>
           </a:p>
@@ -4455,7 +4454,7 @@
             <a:fld id="{B61BEF0D-F0BB-DE4B-95CE-6DB70DBA9567}" type="datetimeFigureOut">
               <a:rPr lang="en-US" dirty="0"/>
               <a:pPr/>
-              <a:t>6/14/2020</a:t>
+              <a:t>6/15/2020</a:t>
             </a:fld>
             <a:endParaRPr lang="en-US" dirty="0"/>
           </a:p>
@@ -4737,7 +4736,7 @@
             <a:fld id="{B61BEF0D-F0BB-DE4B-95CE-6DB70DBA9567}" type="datetimeFigureOut">
               <a:rPr lang="en-US" dirty="0"/>
               <a:pPr/>
-              <a:t>6/14/2020</a:t>
+              <a:t>6/15/2020</a:t>
             </a:fld>
             <a:endParaRPr lang="en-US" dirty="0"/>
           </a:p>
@@ -5058,7 +5057,7 @@
             <a:fld id="{B61BEF0D-F0BB-DE4B-95CE-6DB70DBA9567}" type="datetimeFigureOut">
               <a:rPr lang="en-US" dirty="0"/>
               <a:pPr/>
-              <a:t>6/14/2020</a:t>
+              <a:t>6/15/2020</a:t>
             </a:fld>
             <a:endParaRPr lang="en-US" dirty="0"/>
           </a:p>
@@ -5269,7 +5268,7 @@
             <a:fld id="{B61BEF0D-F0BB-DE4B-95CE-6DB70DBA9567}" type="datetimeFigureOut">
               <a:rPr lang="en-US" dirty="0"/>
               <a:pPr/>
-              <a:t>6/14/2020</a:t>
+              <a:t>6/15/2020</a:t>
             </a:fld>
             <a:endParaRPr lang="en-US" dirty="0"/>
           </a:p>
@@ -5850,15 +5849,6 @@
 <file path=ppt/slides/slide2.xml><?xml version="1.0" encoding="utf-8"?>
 <p:sld xmlns:a="http://schemas.openxmlformats.org/drawingml/2006/main" xmlns:r="http://schemas.openxmlformats.org/officeDocument/2006/relationships" xmlns:p="http://schemas.openxmlformats.org/presentationml/2006/main">
   <p:cSld>
-    <p:bg>
-      <p:bgPr>
-        <a:blipFill>
-          <a:blip r:embed="rId2"/>
-          <a:stretch/>
-        </a:blipFill>
-        <a:effectLst/>
-      </p:bgPr>
-    </p:bg>
     <p:spTree>
       <p:nvGrpSpPr>
         <p:cNvPr id="1" name=""/>
@@ -5878,7 +5868,7 @@
           <p:cNvPr id="2" name="Title 1">
             <a:extLst>
               <a:ext uri="{FF2B5EF4-FFF2-40B4-BE49-F238E27FC236}">
-                <a16:creationId xmlns:a16="http://schemas.microsoft.com/office/drawing/2014/main" id="{F66AE638-81AF-463B-A386-67B26BF59843}"/>
+                <a16:creationId xmlns:a16="http://schemas.microsoft.com/office/drawing/2014/main" id="{3B586C7A-F6BE-45ED-9D5A-66EEFA1523CF}"/>
               </a:ext>
             </a:extLst>
           </p:cNvPr>
@@ -5889,10 +5879,38 @@
             <p:ph type="title"/>
           </p:nvPr>
         </p:nvSpPr>
+        <p:spPr/>
+        <p:txBody>
+          <a:bodyPr/>
+          <a:lstStyle/>
+          <a:p>
+            <a:r>
+              <a:rPr lang="en-US" dirty="0"/>
+              <a:t>Milestone 1</a:t>
+            </a:r>
+          </a:p>
+        </p:txBody>
+      </p:sp>
+      <p:sp>
+        <p:nvSpPr>
+          <p:cNvPr id="3" name="Content Placeholder 2">
+            <a:extLst>
+              <a:ext uri="{FF2B5EF4-FFF2-40B4-BE49-F238E27FC236}">
+                <a16:creationId xmlns:a16="http://schemas.microsoft.com/office/drawing/2014/main" id="{55842C0A-B20F-4904-A124-1B8741AD6EDD}"/>
+              </a:ext>
+            </a:extLst>
+          </p:cNvPr>
+          <p:cNvSpPr>
+            <a:spLocks noGrp="1"/>
+          </p:cNvSpPr>
+          <p:nvPr>
+            <p:ph idx="1"/>
+          </p:nvPr>
+        </p:nvSpPr>
         <p:spPr>
           <a:xfrm>
-            <a:off x="685800" y="1030288"/>
-            <a:ext cx="4785744" cy="1035579"/>
+            <a:off x="685801" y="1828801"/>
+            <a:ext cx="10131425" cy="4419600"/>
           </a:xfrm>
         </p:spPr>
         <p:txBody>
@@ -5903,428 +5921,77 @@
           <a:p>
             <a:r>
               <a:rPr lang="en-US" dirty="0"/>
-              <a:t>Gameplay</a:t>
-            </a:r>
-          </a:p>
-        </p:txBody>
-      </p:sp>
-      <p:sp>
-        <p:nvSpPr>
-          <p:cNvPr id="16" name="Content Placeholder 15">
-            <a:extLst>
-              <a:ext uri="{FF2B5EF4-FFF2-40B4-BE49-F238E27FC236}">
-                <a16:creationId xmlns:a16="http://schemas.microsoft.com/office/drawing/2014/main" id="{76BD0824-4FA3-4753-ABC4-68B8C28A4A2E}"/>
-              </a:ext>
-            </a:extLst>
-          </p:cNvPr>
-          <p:cNvSpPr>
-            <a:spLocks noGrp="1"/>
-          </p:cNvSpPr>
-          <p:nvPr>
-            <p:ph idx="1"/>
-          </p:nvPr>
-        </p:nvSpPr>
-        <p:spPr>
-          <a:xfrm>
-            <a:off x="685800" y="2142067"/>
-            <a:ext cx="4785744" cy="3649133"/>
-          </a:xfrm>
-        </p:spPr>
-        <p:txBody>
-          <a:bodyPr>
-            <a:normAutofit/>
-          </a:bodyPr>
-          <a:lstStyle/>
-          <a:p>
-            <a:r>
-              <a:rPr lang="en-US" dirty="0"/>
-              <a:t>Lots of bullets</a:t>
-            </a:r>
-          </a:p>
-          <a:p>
-            <a:r>
-              <a:rPr lang="en-US" dirty="0"/>
-              <a:t>Lots of guns</a:t>
-            </a:r>
-          </a:p>
-          <a:p>
-            <a:r>
-              <a:rPr lang="en-US" dirty="0"/>
-              <a:t>Somehow dodge everything</a:t>
-            </a:r>
-          </a:p>
-          <a:p>
-            <a:r>
-              <a:rPr lang="en-US" dirty="0"/>
-              <a:t>Win</a:t>
-            </a:r>
-          </a:p>
-          <a:p>
-            <a:r>
-              <a:rPr lang="en-US" dirty="0"/>
-              <a:t>Incursion on Super Steroids</a:t>
-            </a:r>
-          </a:p>
-        </p:txBody>
-      </p:sp>
-      <p:pic>
-        <p:nvPicPr>
-          <p:cNvPr id="8" name="Picture 7" descr="A picture containing grass, ball, player, black&#10;&#10;Description automatically generated">
-            <a:extLst>
-              <a:ext uri="{FF2B5EF4-FFF2-40B4-BE49-F238E27FC236}">
-                <a16:creationId xmlns:a16="http://schemas.microsoft.com/office/drawing/2014/main" id="{E8E2ECDA-9BEA-451E-9C21-799EF767AC5C}"/>
-              </a:ext>
-            </a:extLst>
-          </p:cNvPr>
-          <p:cNvPicPr>
-            <a:picLocks noChangeAspect="1"/>
-          </p:cNvPicPr>
-          <p:nvPr/>
-        </p:nvPicPr>
-        <p:blipFill>
-          <a:blip r:embed="rId3">
-            <a:extLst>
-              <a:ext uri="{837473B0-CC2E-450A-ABE3-18F120FF3D39}">
-                <a1611:picAttrSrcUrl xmlns:a1611="http://schemas.microsoft.com/office/drawing/2016/11/main" r:id="rId4"/>
-              </a:ext>
-            </a:extLst>
-          </a:blip>
-          <a:stretch>
-            <a:fillRect/>
-          </a:stretch>
-        </p:blipFill>
-        <p:spPr>
-          <a:xfrm>
-            <a:off x="3844213" y="740526"/>
-            <a:ext cx="3732140" cy="2114878"/>
-          </a:xfrm>
-          <a:prstGeom prst="roundRect">
-            <a:avLst>
-              <a:gd name="adj" fmla="val 7306"/>
-            </a:avLst>
-          </a:prstGeom>
-          <a:ln w="50800" cap="sq" cmpd="dbl">
-            <a:gradFill flip="none" rotWithShape="1">
-              <a:gsLst>
-                <a:gs pos="0">
-                  <a:srgbClr val="FFFFFF"/>
-                </a:gs>
-                <a:gs pos="100000">
-                  <a:schemeClr val="tx1">
-                    <a:alpha val="0"/>
-                  </a:schemeClr>
-                </a:gs>
-              </a:gsLst>
-              <a:path path="circle">
-                <a:fillToRect l="50000" t="50000" r="50000" b="50000"/>
-              </a:path>
-              <a:tileRect/>
-            </a:gradFill>
-            <a:miter lim="800000"/>
-          </a:ln>
-          <a:effectLst>
-            <a:outerShdw blurRad="254000" algn="tl" rotWithShape="0">
-              <a:srgbClr val="000000">
-                <a:alpha val="43000"/>
-              </a:srgbClr>
-            </a:outerShdw>
-          </a:effectLst>
-        </p:spPr>
-      </p:pic>
-      <p:pic>
-        <p:nvPicPr>
-          <p:cNvPr id="5" name="Content Placeholder 4" descr="A view of a building&#10;&#10;Description automatically generated">
-            <a:extLst>
-              <a:ext uri="{FF2B5EF4-FFF2-40B4-BE49-F238E27FC236}">
-                <a16:creationId xmlns:a16="http://schemas.microsoft.com/office/drawing/2014/main" id="{CAE8005F-E530-4A6C-A9C1-761BD1A56417}"/>
-              </a:ext>
-            </a:extLst>
-          </p:cNvPr>
-          <p:cNvPicPr>
-            <a:picLocks noChangeAspect="1"/>
-          </p:cNvPicPr>
-          <p:nvPr/>
-        </p:nvPicPr>
-        <p:blipFill>
-          <a:blip r:embed="rId5">
-            <a:extLst>
-              <a:ext uri="{837473B0-CC2E-450A-ABE3-18F120FF3D39}">
-                <a1611:picAttrSrcUrl xmlns:a1611="http://schemas.microsoft.com/office/drawing/2016/11/main" r:id="rId6"/>
-              </a:ext>
-            </a:extLst>
-          </a:blip>
-          <a:stretch>
-            <a:fillRect/>
-          </a:stretch>
-        </p:blipFill>
-        <p:spPr>
-          <a:xfrm>
-            <a:off x="7781731" y="680440"/>
-            <a:ext cx="3799145" cy="2137018"/>
-          </a:xfrm>
-          <a:prstGeom prst="roundRect">
-            <a:avLst>
-              <a:gd name="adj" fmla="val 7306"/>
-            </a:avLst>
-          </a:prstGeom>
-          <a:ln w="50800" cap="sq" cmpd="dbl">
-            <a:gradFill flip="none" rotWithShape="1">
-              <a:gsLst>
-                <a:gs pos="0">
-                  <a:srgbClr val="FFFFFF"/>
-                </a:gs>
-                <a:gs pos="100000">
-                  <a:schemeClr val="tx1">
-                    <a:alpha val="0"/>
-                  </a:schemeClr>
-                </a:gs>
-              </a:gsLst>
-              <a:path path="circle">
-                <a:fillToRect l="50000" t="50000" r="50000" b="50000"/>
-              </a:path>
-              <a:tileRect/>
-            </a:gradFill>
-            <a:miter lim="800000"/>
-          </a:ln>
-          <a:effectLst>
-            <a:outerShdw blurRad="254000" algn="tl" rotWithShape="0">
-              <a:srgbClr val="000000">
-                <a:alpha val="43000"/>
-              </a:srgbClr>
-            </a:outerShdw>
-          </a:effectLst>
-        </p:spPr>
-      </p:pic>
-      <p:pic>
-        <p:nvPicPr>
-          <p:cNvPr id="11" name="Picture 10" descr="A picture containing building, outdoor, light, traffic&#10;&#10;Description automatically generated">
-            <a:extLst>
-              <a:ext uri="{FF2B5EF4-FFF2-40B4-BE49-F238E27FC236}">
-                <a16:creationId xmlns:a16="http://schemas.microsoft.com/office/drawing/2014/main" id="{3C10D1FF-1710-4253-BE9C-7B63C2317511}"/>
-              </a:ext>
-            </a:extLst>
-          </p:cNvPr>
-          <p:cNvPicPr>
-            <a:picLocks noChangeAspect="1"/>
-          </p:cNvPicPr>
-          <p:nvPr/>
-        </p:nvPicPr>
-        <p:blipFill>
-          <a:blip r:embed="rId7">
-            <a:extLst>
-              <a:ext uri="{837473B0-CC2E-450A-ABE3-18F120FF3D39}">
-                <a1611:picAttrSrcUrl xmlns:a1611="http://schemas.microsoft.com/office/drawing/2016/11/main" r:id="rId4"/>
-              </a:ext>
-            </a:extLst>
-          </a:blip>
-          <a:stretch>
-            <a:fillRect/>
-          </a:stretch>
-        </p:blipFill>
-        <p:spPr>
-          <a:xfrm>
-            <a:off x="4719132" y="3448508"/>
-            <a:ext cx="4962030" cy="2791142"/>
-          </a:xfrm>
-          <a:prstGeom prst="roundRect">
-            <a:avLst>
-              <a:gd name="adj" fmla="val 7306"/>
-            </a:avLst>
-          </a:prstGeom>
-          <a:ln w="50800" cap="sq" cmpd="dbl">
-            <a:gradFill flip="none" rotWithShape="1">
-              <a:gsLst>
-                <a:gs pos="0">
-                  <a:srgbClr val="FFFFFF"/>
-                </a:gs>
-                <a:gs pos="100000">
-                  <a:schemeClr val="tx1">
-                    <a:alpha val="0"/>
-                  </a:schemeClr>
-                </a:gs>
-              </a:gsLst>
-              <a:path path="circle">
-                <a:fillToRect l="50000" t="50000" r="50000" b="50000"/>
-              </a:path>
-              <a:tileRect/>
-            </a:gradFill>
-            <a:miter lim="800000"/>
-          </a:ln>
-          <a:effectLst>
-            <a:outerShdw blurRad="254000" algn="tl" rotWithShape="0">
-              <a:srgbClr val="000000">
-                <a:alpha val="43000"/>
-              </a:srgbClr>
-            </a:outerShdw>
-          </a:effectLst>
-        </p:spPr>
-      </p:pic>
-      <p:sp>
-        <p:nvSpPr>
-          <p:cNvPr id="9" name="TextBox 8">
-            <a:extLst>
-              <a:ext uri="{FF2B5EF4-FFF2-40B4-BE49-F238E27FC236}">
-                <a16:creationId xmlns:a16="http://schemas.microsoft.com/office/drawing/2014/main" id="{EABC36D3-25C6-47A5-B63F-F3C2FC093A02}"/>
-              </a:ext>
-            </a:extLst>
-          </p:cNvPr>
-          <p:cNvSpPr txBox="1"/>
-          <p:nvPr/>
-        </p:nvSpPr>
-        <p:spPr>
-          <a:xfrm>
-            <a:off x="9751908" y="6870700"/>
-            <a:ext cx="2440092" cy="200055"/>
-          </a:xfrm>
-          <a:prstGeom prst="rect">
-            <a:avLst/>
-          </a:prstGeom>
-          <a:solidFill>
-            <a:srgbClr val="000000"/>
-          </a:solidFill>
-        </p:spPr>
-        <p:txBody>
-          <a:bodyPr wrap="none" rtlCol="0">
-            <a:spAutoFit/>
-          </a:bodyPr>
-          <a:lstStyle/>
-          <a:p>
-            <a:pPr algn="r">
-              <a:spcAft>
-                <a:spcPts val="600"/>
-              </a:spcAft>
-            </a:pPr>
-            <a:r>
-              <a:rPr lang="en-US" sz="700">
-                <a:solidFill>
-                  <a:srgbClr val="FFFFFF"/>
-                </a:solidFill>
-                <a:hlinkClick r:id="rId4" tooltip="https://enterthegungeon.gamepedia.com/Enter_the_Gungeon_Wiki">
-                  <a:extLst>
-                    <a:ext uri="{A12FA001-AC4F-418D-AE19-62706E023703}">
-                      <ahyp:hlinkClr xmlns:ahyp="http://schemas.microsoft.com/office/drawing/2018/hyperlinkcolor" val="tx"/>
-                    </a:ext>
-                  </a:extLst>
-                </a:hlinkClick>
-              </a:rPr>
-              <a:t>This Photo</a:t>
-            </a:r>
-            <a:r>
-              <a:rPr lang="en-US" sz="700">
-                <a:solidFill>
-                  <a:srgbClr val="FFFFFF"/>
-                </a:solidFill>
-              </a:rPr>
-              <a:t> by Unknown Author is licensed under </a:t>
-            </a:r>
-            <a:r>
-              <a:rPr lang="en-US" sz="700">
-                <a:solidFill>
-                  <a:srgbClr val="FFFFFF"/>
-                </a:solidFill>
-                <a:hlinkClick r:id="rId8" tooltip="https://creativecommons.org/licenses/by-nc-sa/3.0/">
-                  <a:extLst>
-                    <a:ext uri="{A12FA001-AC4F-418D-AE19-62706E023703}">
-                      <ahyp:hlinkClr xmlns:ahyp="http://schemas.microsoft.com/office/drawing/2018/hyperlinkcolor" val="tx"/>
-                    </a:ext>
-                  </a:extLst>
-                </a:hlinkClick>
-              </a:rPr>
-              <a:t>CC BY-SA-NC</a:t>
-            </a:r>
-            <a:endParaRPr lang="en-US" sz="700">
-              <a:solidFill>
-                <a:srgbClr val="FFFFFF"/>
-              </a:solidFill>
-            </a:endParaRPr>
-          </a:p>
-        </p:txBody>
-      </p:sp>
-      <p:sp>
-        <p:nvSpPr>
-          <p:cNvPr id="12" name="TextBox 11">
-            <a:extLst>
-              <a:ext uri="{FF2B5EF4-FFF2-40B4-BE49-F238E27FC236}">
-                <a16:creationId xmlns:a16="http://schemas.microsoft.com/office/drawing/2014/main" id="{073C8BD3-45C6-4C2E-9BF1-B1CE11D0F27C}"/>
-              </a:ext>
-            </a:extLst>
-          </p:cNvPr>
-          <p:cNvSpPr txBox="1"/>
-          <p:nvPr/>
-        </p:nvSpPr>
-        <p:spPr>
-          <a:xfrm>
-            <a:off x="7299117" y="6870700"/>
-            <a:ext cx="2440091" cy="200055"/>
-          </a:xfrm>
-          <a:prstGeom prst="rect">
-            <a:avLst/>
-          </a:prstGeom>
-          <a:solidFill>
-            <a:srgbClr val="000000"/>
-          </a:solidFill>
-        </p:spPr>
-        <p:txBody>
-          <a:bodyPr wrap="none" rtlCol="0">
-            <a:spAutoFit/>
-          </a:bodyPr>
-          <a:lstStyle/>
-          <a:p>
-            <a:pPr algn="r">
-              <a:spcAft>
-                <a:spcPts val="600"/>
-              </a:spcAft>
-            </a:pPr>
-            <a:r>
-              <a:rPr lang="en-US" sz="700">
-                <a:solidFill>
-                  <a:srgbClr val="FFFFFF"/>
-                </a:solidFill>
-                <a:hlinkClick r:id="rId4" tooltip="https://enterthegungeon.gamepedia.com/Enter_the_Gungeon_Wiki">
-                  <a:extLst>
-                    <a:ext uri="{A12FA001-AC4F-418D-AE19-62706E023703}">
-                      <ahyp:hlinkClr xmlns:ahyp="http://schemas.microsoft.com/office/drawing/2018/hyperlinkcolor" val="tx"/>
-                    </a:ext>
-                  </a:extLst>
-                </a:hlinkClick>
-              </a:rPr>
-              <a:t>This Photo</a:t>
-            </a:r>
-            <a:r>
-              <a:rPr lang="en-US" sz="700">
-                <a:solidFill>
-                  <a:srgbClr val="FFFFFF"/>
-                </a:solidFill>
-              </a:rPr>
-              <a:t> by Unknown Author is licensed under </a:t>
-            </a:r>
-            <a:r>
-              <a:rPr lang="en-US" sz="700">
-                <a:solidFill>
-                  <a:srgbClr val="FFFFFF"/>
-                </a:solidFill>
-                <a:hlinkClick r:id="rId8" tooltip="https://creativecommons.org/licenses/by-nc-sa/3.0/">
-                  <a:extLst>
-                    <a:ext uri="{A12FA001-AC4F-418D-AE19-62706E023703}">
-                      <ahyp:hlinkClr xmlns:ahyp="http://schemas.microsoft.com/office/drawing/2018/hyperlinkcolor" val="tx"/>
-                    </a:ext>
-                  </a:extLst>
-                </a:hlinkClick>
-              </a:rPr>
-              <a:t>CC BY-SA-NC</a:t>
-            </a:r>
-            <a:endParaRPr lang="en-US" sz="700">
-              <a:solidFill>
-                <a:srgbClr val="FFFFFF"/>
-              </a:solidFill>
-            </a:endParaRPr>
+              <a:t>Milestone 1 goal</a:t>
+            </a:r>
+          </a:p>
+          <a:p>
+            <a:pPr lvl="1"/>
+            <a:r>
+              <a:rPr lang="en-US" dirty="0"/>
+              <a:t>Create the data driven actors, weapons, bullets, etc. and allow the player to walk around and shoot</a:t>
+            </a:r>
+          </a:p>
+          <a:p>
+            <a:pPr lvl="1"/>
+            <a:r>
+              <a:rPr lang="en-US" dirty="0"/>
+              <a:t>Focus on building architecture</a:t>
+            </a:r>
+          </a:p>
+          <a:p>
+            <a:pPr lvl="1"/>
+            <a:r>
+              <a:rPr lang="en-US" dirty="0"/>
+              <a:t>Simple AI</a:t>
+            </a:r>
+          </a:p>
+          <a:p>
+            <a:pPr lvl="1"/>
+            <a:r>
+              <a:rPr lang="en-US" dirty="0"/>
+              <a:t>Basic loading screen and menu</a:t>
+            </a:r>
+          </a:p>
+          <a:p>
+            <a:r>
+              <a:rPr lang="en-US" dirty="0"/>
+              <a:t>Achievements</a:t>
+            </a:r>
+          </a:p>
+          <a:p>
+            <a:pPr lvl="1"/>
+            <a:r>
+              <a:rPr lang="en-US" dirty="0"/>
+              <a:t>Basic Map (using Adventure base game)</a:t>
+            </a:r>
+          </a:p>
+          <a:p>
+            <a:pPr lvl="1"/>
+            <a:r>
+              <a:rPr lang="en-US" dirty="0"/>
+              <a:t>Basic weapon, bullets, walking, and shooting</a:t>
+            </a:r>
+          </a:p>
+          <a:p>
+            <a:pPr lvl="1"/>
+            <a:r>
+              <a:rPr lang="en-US" dirty="0"/>
+              <a:t>Simple AI</a:t>
+            </a:r>
+          </a:p>
+          <a:p>
+            <a:pPr lvl="1"/>
+            <a:r>
+              <a:rPr lang="en-US" dirty="0"/>
+              <a:t>Basic loading screen and menu</a:t>
+            </a:r>
           </a:p>
         </p:txBody>
       </p:sp>
     </p:spTree>
     <p:extLst>
       <p:ext uri="{BB962C8B-B14F-4D97-AF65-F5344CB8AC3E}">
-        <p14:creationId xmlns:p14="http://schemas.microsoft.com/office/powerpoint/2010/main" val="483090309"/>
+        <p14:creationId xmlns:p14="http://schemas.microsoft.com/office/powerpoint/2010/main" val="368334227"/>
       </p:ext>
     </p:extLst>
   </p:cSld>
@@ -6374,161 +6041,6 @@
           <a:p>
             <a:r>
               <a:rPr lang="en-US" dirty="0"/>
-              <a:t>Milestone 1</a:t>
-            </a:r>
-          </a:p>
-        </p:txBody>
-      </p:sp>
-      <p:sp>
-        <p:nvSpPr>
-          <p:cNvPr id="3" name="Content Placeholder 2">
-            <a:extLst>
-              <a:ext uri="{FF2B5EF4-FFF2-40B4-BE49-F238E27FC236}">
-                <a16:creationId xmlns:a16="http://schemas.microsoft.com/office/drawing/2014/main" id="{55842C0A-B20F-4904-A124-1B8741AD6EDD}"/>
-              </a:ext>
-            </a:extLst>
-          </p:cNvPr>
-          <p:cNvSpPr>
-            <a:spLocks noGrp="1"/>
-          </p:cNvSpPr>
-          <p:nvPr>
-            <p:ph idx="1"/>
-          </p:nvPr>
-        </p:nvSpPr>
-        <p:spPr>
-          <a:xfrm>
-            <a:off x="685801" y="1828801"/>
-            <a:ext cx="10131425" cy="4419600"/>
-          </a:xfrm>
-        </p:spPr>
-        <p:txBody>
-          <a:bodyPr>
-            <a:normAutofit/>
-          </a:bodyPr>
-          <a:lstStyle/>
-          <a:p>
-            <a:r>
-              <a:rPr lang="en-US" dirty="0"/>
-              <a:t>Milestone 1 goal</a:t>
-            </a:r>
-          </a:p>
-          <a:p>
-            <a:pPr lvl="1"/>
-            <a:r>
-              <a:rPr lang="en-US" dirty="0"/>
-              <a:t>Create the data driven actors, weapons, bullets, etc. and allow the player to walk around and shoot</a:t>
-            </a:r>
-          </a:p>
-          <a:p>
-            <a:pPr lvl="1"/>
-            <a:r>
-              <a:rPr lang="en-US" dirty="0"/>
-              <a:t>Focus on building architecture</a:t>
-            </a:r>
-          </a:p>
-          <a:p>
-            <a:pPr lvl="1"/>
-            <a:r>
-              <a:rPr lang="en-US" dirty="0"/>
-              <a:t>Simple AI</a:t>
-            </a:r>
-          </a:p>
-          <a:p>
-            <a:pPr lvl="1"/>
-            <a:r>
-              <a:rPr lang="en-US" dirty="0"/>
-              <a:t>Basic loading screen and menu</a:t>
-            </a:r>
-          </a:p>
-          <a:p>
-            <a:r>
-              <a:rPr lang="en-US" dirty="0"/>
-              <a:t>Achievements</a:t>
-            </a:r>
-          </a:p>
-          <a:p>
-            <a:pPr lvl="1"/>
-            <a:r>
-              <a:rPr lang="en-US" dirty="0"/>
-              <a:t>Basic Map (using Adventure base game)</a:t>
-            </a:r>
-          </a:p>
-          <a:p>
-            <a:pPr lvl="1"/>
-            <a:r>
-              <a:rPr lang="en-US" dirty="0"/>
-              <a:t>Basic weapon, bullets, walking, and shooting</a:t>
-            </a:r>
-          </a:p>
-          <a:p>
-            <a:pPr lvl="1"/>
-            <a:r>
-              <a:rPr lang="en-US" dirty="0"/>
-              <a:t>Simple AI</a:t>
-            </a:r>
-          </a:p>
-          <a:p>
-            <a:pPr lvl="1"/>
-            <a:r>
-              <a:rPr lang="en-US" dirty="0"/>
-              <a:t>Basic loading screen and menu</a:t>
-            </a:r>
-          </a:p>
-        </p:txBody>
-      </p:sp>
-    </p:spTree>
-    <p:extLst>
-      <p:ext uri="{BB962C8B-B14F-4D97-AF65-F5344CB8AC3E}">
-        <p14:creationId xmlns:p14="http://schemas.microsoft.com/office/powerpoint/2010/main" val="368334227"/>
-      </p:ext>
-    </p:extLst>
-  </p:cSld>
-  <p:clrMapOvr>
-    <a:masterClrMapping/>
-  </p:clrMapOvr>
-</p:sld>
-</file>
-
-<file path=ppt/slides/slide4.xml><?xml version="1.0" encoding="utf-8"?>
-<p:sld xmlns:a="http://schemas.openxmlformats.org/drawingml/2006/main" xmlns:r="http://schemas.openxmlformats.org/officeDocument/2006/relationships" xmlns:p="http://schemas.openxmlformats.org/presentationml/2006/main">
-  <p:cSld>
-    <p:spTree>
-      <p:nvGrpSpPr>
-        <p:cNvPr id="1" name=""/>
-        <p:cNvGrpSpPr/>
-        <p:nvPr/>
-      </p:nvGrpSpPr>
-      <p:grpSpPr>
-        <a:xfrm>
-          <a:off x="0" y="0"/>
-          <a:ext cx="0" cy="0"/>
-          <a:chOff x="0" y="0"/>
-          <a:chExt cx="0" cy="0"/>
-        </a:xfrm>
-      </p:grpSpPr>
-      <p:sp>
-        <p:nvSpPr>
-          <p:cNvPr id="2" name="Title 1">
-            <a:extLst>
-              <a:ext uri="{FF2B5EF4-FFF2-40B4-BE49-F238E27FC236}">
-                <a16:creationId xmlns:a16="http://schemas.microsoft.com/office/drawing/2014/main" id="{3B586C7A-F6BE-45ED-9D5A-66EEFA1523CF}"/>
-              </a:ext>
-            </a:extLst>
-          </p:cNvPr>
-          <p:cNvSpPr>
-            <a:spLocks noGrp="1"/>
-          </p:cNvSpPr>
-          <p:nvPr>
-            <p:ph type="title"/>
-          </p:nvPr>
-        </p:nvSpPr>
-        <p:spPr/>
-        <p:txBody>
-          <a:bodyPr/>
-          <a:lstStyle/>
-          <a:p>
-            <a:r>
-              <a:rPr lang="en-US" dirty="0"/>
               <a:t>Milestone 1 Analysis</a:t>
             </a:r>
           </a:p>
@@ -6635,7 +6147,7 @@
 </p:sld>
 </file>
 
-<file path=ppt/slides/slide5.xml><?xml version="1.0" encoding="utf-8"?>
+<file path=ppt/slides/slide4.xml><?xml version="1.0" encoding="utf-8"?>
 <p:sld xmlns:a="http://schemas.openxmlformats.org/drawingml/2006/main" xmlns:r="http://schemas.openxmlformats.org/officeDocument/2006/relationships" xmlns:p="http://schemas.openxmlformats.org/presentationml/2006/main">
   <p:cSld>
     <p:spTree>

</xml_diff>